<commit_message>
Version Control Lab so far.
</commit_message>
<xml_diff>
--- a/Reading Presentation/SpiralSoftwareDevelopment.pptx
+++ b/Reading Presentation/SpiralSoftwareDevelopment.pptx
@@ -5,7 +5,7 @@
     <p:sldMasterId id="2147483669" r:id="rId1"/>
   </p:sldMasterIdLst>
   <p:notesMasterIdLst>
-    <p:notesMasterId r:id="rId10"/>
+    <p:notesMasterId r:id="rId11"/>
   </p:notesMasterIdLst>
   <p:sldIdLst>
     <p:sldId id="256" r:id="rId2"/>
@@ -16,6 +16,7 @@
     <p:sldId id="260" r:id="rId7"/>
     <p:sldId id="261" r:id="rId8"/>
     <p:sldId id="262" r:id="rId9"/>
+    <p:sldId id="264" r:id="rId10"/>
   </p:sldIdLst>
   <p:sldSz cx="9144000" cy="6858000" type="screen4x3"/>
   <p:notesSz cx="6858000" cy="9144000"/>
@@ -116,10 +117,10 @@
   </p:defaultTextStyle>
   <p:extLst>
     <p:ext uri="{EFAFB233-063F-42B5-8137-9DF3F51BA10A}">
-      <p15:sldGuideLst xmlns:p15="http://schemas.microsoft.com/office/powerpoint/2012/main"/>
+      <p15:sldGuideLst xmlns="" xmlns:p15="http://schemas.microsoft.com/office/powerpoint/2012/main"/>
     </p:ext>
     <p:ext uri="{2D200454-40CA-4A62-9FC3-DE9A4176ACB9}">
-      <p15:notesGuideLst xmlns:p15="http://schemas.microsoft.com/office/powerpoint/2012/main"/>
+      <p15:notesGuideLst xmlns="" xmlns:p15="http://schemas.microsoft.com/office/powerpoint/2012/main"/>
     </p:ext>
   </p:extLst>
 </p:presentation>
@@ -207,7 +208,7 @@
           <a:p>
             <a:fld id="{ABDFDAFD-CD77-4874-B0FF-56B97D9B9B16}" type="datetimeFigureOut">
               <a:rPr lang="en-US" smtClean="0"/>
-              <a:t>2/14/2016</a:t>
+              <a:t>2/16/2016</a:t>
             </a:fld>
             <a:endParaRPr lang="en-US"/>
           </a:p>
@@ -958,7 +959,6 @@
               <a:rPr lang="en-US" baseline="0" dirty="0" smtClean="0"/>
               <a:t>Difficult to distinguish from code and fix model</a:t>
             </a:r>
-            <a:endParaRPr lang="en-US" baseline="0" dirty="0" smtClean="0"/>
           </a:p>
           <a:p>
             <a:pPr marL="171450" lvl="0" indent="-171450">
@@ -1503,8 +1503,8 @@
           </a:prstGeom>
           <a:noFill/>
           <a:extLst>
-            <a:ext uri="{909E8E84-426E-40dd-AFC4-6F175D3DCCD1}">
-              <a14:hiddenFill xmlns:a14="http://schemas.microsoft.com/office/drawing/2010/main" xmlns="">
+            <a:ext uri="{909E8E84-426E-40DD-AFC4-6F175D3DCCD1}">
+              <a14:hiddenFill xmlns:a14="http://schemas.microsoft.com/office/drawing/2010/main">
                 <a:solidFill>
                   <a:srgbClr val="FFFFFF"/>
                 </a:solidFill>
@@ -1563,8 +1563,8 @@
               <a:noFill/>
             </a:ln>
             <a:extLst>
-              <a:ext uri="{91240B29-F687-4f45-9708-019B960494DF}">
-                <a14:hiddenLine xmlns:a14="http://schemas.microsoft.com/office/drawing/2010/main" xmlns="" w="9525">
+              <a:ext uri="{91240B29-F687-4F45-9708-019B960494DF}">
+                <a14:hiddenLine xmlns:a14="http://schemas.microsoft.com/office/drawing/2010/main" w="9525">
                   <a:solidFill>
                     <a:srgbClr val="000000"/>
                   </a:solidFill>
@@ -1653,8 +1653,8 @@
               <a:noFill/>
             </a:ln>
             <a:extLst>
-              <a:ext uri="{91240B29-F687-4f45-9708-019B960494DF}">
-                <a14:hiddenLine xmlns:a14="http://schemas.microsoft.com/office/drawing/2010/main" xmlns="" w="9525">
+              <a:ext uri="{91240B29-F687-4F45-9708-019B960494DF}">
+                <a14:hiddenLine xmlns:a14="http://schemas.microsoft.com/office/drawing/2010/main" w="9525">
                   <a:solidFill>
                     <a:srgbClr val="000000"/>
                   </a:solidFill>
@@ -1743,8 +1743,8 @@
               <a:noFill/>
             </a:ln>
             <a:extLst>
-              <a:ext uri="{91240B29-F687-4f45-9708-019B960494DF}">
-                <a14:hiddenLine xmlns:a14="http://schemas.microsoft.com/office/drawing/2010/main" xmlns="" w="9525">
+              <a:ext uri="{91240B29-F687-4F45-9708-019B960494DF}">
+                <a14:hiddenLine xmlns:a14="http://schemas.microsoft.com/office/drawing/2010/main" w="9525">
                   <a:solidFill>
                     <a:srgbClr val="000000"/>
                   </a:solidFill>
@@ -1777,8 +1777,8 @@
               <a:noFill/>
             </a:ln>
             <a:extLst>
-              <a:ext uri="{91240B29-F687-4f45-9708-019B960494DF}">
-                <a14:hiddenLine xmlns:a14="http://schemas.microsoft.com/office/drawing/2010/main" xmlns="" w="9525">
+              <a:ext uri="{91240B29-F687-4F45-9708-019B960494DF}">
+                <a14:hiddenLine xmlns:a14="http://schemas.microsoft.com/office/drawing/2010/main" w="9525">
                   <a:solidFill>
                     <a:srgbClr val="000000"/>
                   </a:solidFill>
@@ -1867,8 +1867,8 @@
               <a:noFill/>
             </a:ln>
             <a:extLst>
-              <a:ext uri="{91240B29-F687-4f45-9708-019B960494DF}">
-                <a14:hiddenLine xmlns:a14="http://schemas.microsoft.com/office/drawing/2010/main" xmlns="" w="9525">
+              <a:ext uri="{91240B29-F687-4F45-9708-019B960494DF}">
+                <a14:hiddenLine xmlns:a14="http://schemas.microsoft.com/office/drawing/2010/main" w="9525">
                   <a:solidFill>
                     <a:srgbClr val="000000"/>
                   </a:solidFill>
@@ -1929,8 +1929,8 @@
               <a:noFill/>
             </a:ln>
             <a:extLst>
-              <a:ext uri="{91240B29-F687-4f45-9708-019B960494DF}">
-                <a14:hiddenLine xmlns:a14="http://schemas.microsoft.com/office/drawing/2010/main" xmlns="" w="9525">
+              <a:ext uri="{91240B29-F687-4F45-9708-019B960494DF}">
+                <a14:hiddenLine xmlns:a14="http://schemas.microsoft.com/office/drawing/2010/main" w="9525">
                   <a:solidFill>
                     <a:srgbClr val="000000"/>
                   </a:solidFill>
@@ -1991,8 +1991,8 @@
               <a:noFill/>
             </a:ln>
             <a:extLst>
-              <a:ext uri="{91240B29-F687-4f45-9708-019B960494DF}">
-                <a14:hiddenLine xmlns:a14="http://schemas.microsoft.com/office/drawing/2010/main" xmlns="" w="9525">
+              <a:ext uri="{91240B29-F687-4F45-9708-019B960494DF}">
+                <a14:hiddenLine xmlns:a14="http://schemas.microsoft.com/office/drawing/2010/main" w="9525">
                   <a:solidFill>
                     <a:srgbClr val="000000"/>
                   </a:solidFill>
@@ -2081,8 +2081,8 @@
               <a:noFill/>
             </a:ln>
             <a:extLst>
-              <a:ext uri="{91240B29-F687-4f45-9708-019B960494DF}">
-                <a14:hiddenLine xmlns:a14="http://schemas.microsoft.com/office/drawing/2010/main" xmlns="" w="9525">
+              <a:ext uri="{91240B29-F687-4F45-9708-019B960494DF}">
+                <a14:hiddenLine xmlns:a14="http://schemas.microsoft.com/office/drawing/2010/main" w="9525">
                   <a:solidFill>
                     <a:srgbClr val="000000"/>
                   </a:solidFill>
@@ -2143,8 +2143,8 @@
               <a:noFill/>
             </a:ln>
             <a:extLst>
-              <a:ext uri="{91240B29-F687-4f45-9708-019B960494DF}">
-                <a14:hiddenLine xmlns:a14="http://schemas.microsoft.com/office/drawing/2010/main" xmlns="" w="9525">
+              <a:ext uri="{91240B29-F687-4F45-9708-019B960494DF}">
+                <a14:hiddenLine xmlns:a14="http://schemas.microsoft.com/office/drawing/2010/main" w="9525">
                   <a:solidFill>
                     <a:srgbClr val="000000"/>
                   </a:solidFill>
@@ -2205,8 +2205,8 @@
               <a:noFill/>
             </a:ln>
             <a:extLst>
-              <a:ext uri="{91240B29-F687-4f45-9708-019B960494DF}">
-                <a14:hiddenLine xmlns:a14="http://schemas.microsoft.com/office/drawing/2010/main" xmlns="" w="9525">
+              <a:ext uri="{91240B29-F687-4F45-9708-019B960494DF}">
+                <a14:hiddenLine xmlns:a14="http://schemas.microsoft.com/office/drawing/2010/main" w="9525">
                   <a:solidFill>
                     <a:srgbClr val="000000"/>
                   </a:solidFill>
@@ -2295,8 +2295,8 @@
               <a:noFill/>
             </a:ln>
             <a:extLst>
-              <a:ext uri="{91240B29-F687-4f45-9708-019B960494DF}">
-                <a14:hiddenLine xmlns:a14="http://schemas.microsoft.com/office/drawing/2010/main" xmlns="" w="9525">
+              <a:ext uri="{91240B29-F687-4F45-9708-019B960494DF}">
+                <a14:hiddenLine xmlns:a14="http://schemas.microsoft.com/office/drawing/2010/main" w="9525">
                   <a:solidFill>
                     <a:srgbClr val="000000"/>
                   </a:solidFill>
@@ -2385,8 +2385,8 @@
               <a:noFill/>
             </a:ln>
             <a:extLst>
-              <a:ext uri="{91240B29-F687-4f45-9708-019B960494DF}">
-                <a14:hiddenLine xmlns:a14="http://schemas.microsoft.com/office/drawing/2010/main" xmlns="" w="9525">
+              <a:ext uri="{91240B29-F687-4F45-9708-019B960494DF}">
+                <a14:hiddenLine xmlns:a14="http://schemas.microsoft.com/office/drawing/2010/main" w="9525">
                   <a:solidFill>
                     <a:srgbClr val="000000"/>
                   </a:solidFill>
@@ -2447,8 +2447,8 @@
               <a:noFill/>
             </a:ln>
             <a:extLst>
-              <a:ext uri="{91240B29-F687-4f45-9708-019B960494DF}">
-                <a14:hiddenLine xmlns:a14="http://schemas.microsoft.com/office/drawing/2010/main" xmlns="" w="9525">
+              <a:ext uri="{91240B29-F687-4F45-9708-019B960494DF}">
+                <a14:hiddenLine xmlns:a14="http://schemas.microsoft.com/office/drawing/2010/main" w="9525">
                   <a:solidFill>
                     <a:srgbClr val="000000"/>
                   </a:solidFill>
@@ -2557,8 +2557,8 @@
               <a:noFill/>
             </a:ln>
             <a:extLst>
-              <a:ext uri="{91240B29-F687-4f45-9708-019B960494DF}">
-                <a14:hiddenLine xmlns:a14="http://schemas.microsoft.com/office/drawing/2010/main" xmlns="" w="9525">
+              <a:ext uri="{91240B29-F687-4F45-9708-019B960494DF}">
+                <a14:hiddenLine xmlns:a14="http://schemas.microsoft.com/office/drawing/2010/main" w="9525">
                   <a:solidFill>
                     <a:srgbClr val="000000"/>
                   </a:solidFill>
@@ -2619,8 +2619,8 @@
               <a:noFill/>
             </a:ln>
             <a:extLst>
-              <a:ext uri="{91240B29-F687-4f45-9708-019B960494DF}">
-                <a14:hiddenLine xmlns:a14="http://schemas.microsoft.com/office/drawing/2010/main" xmlns="" w="9525">
+              <a:ext uri="{91240B29-F687-4F45-9708-019B960494DF}">
+                <a14:hiddenLine xmlns:a14="http://schemas.microsoft.com/office/drawing/2010/main" w="9525">
                   <a:solidFill>
                     <a:srgbClr val="000000"/>
                   </a:solidFill>
@@ -2709,8 +2709,8 @@
               <a:noFill/>
             </a:ln>
             <a:extLst>
-              <a:ext uri="{91240B29-F687-4f45-9708-019B960494DF}">
-                <a14:hiddenLine xmlns:a14="http://schemas.microsoft.com/office/drawing/2010/main" xmlns="" w="9525">
+              <a:ext uri="{91240B29-F687-4F45-9708-019B960494DF}">
+                <a14:hiddenLine xmlns:a14="http://schemas.microsoft.com/office/drawing/2010/main" w="9525">
                   <a:solidFill>
                     <a:srgbClr val="000000"/>
                   </a:solidFill>
@@ -2799,8 +2799,8 @@
               <a:noFill/>
             </a:ln>
             <a:extLst>
-              <a:ext uri="{91240B29-F687-4f45-9708-019B960494DF}">
-                <a14:hiddenLine xmlns:a14="http://schemas.microsoft.com/office/drawing/2010/main" xmlns="" w="9525">
+              <a:ext uri="{91240B29-F687-4F45-9708-019B960494DF}">
+                <a14:hiddenLine xmlns:a14="http://schemas.microsoft.com/office/drawing/2010/main" w="9525">
                   <a:solidFill>
                     <a:srgbClr val="000000"/>
                   </a:solidFill>
@@ -2861,8 +2861,8 @@
               <a:noFill/>
             </a:ln>
             <a:extLst>
-              <a:ext uri="{91240B29-F687-4f45-9708-019B960494DF}">
-                <a14:hiddenLine xmlns:a14="http://schemas.microsoft.com/office/drawing/2010/main" xmlns="" w="9525">
+              <a:ext uri="{91240B29-F687-4F45-9708-019B960494DF}">
+                <a14:hiddenLine xmlns:a14="http://schemas.microsoft.com/office/drawing/2010/main" w="9525">
                   <a:solidFill>
                     <a:srgbClr val="000000"/>
                   </a:solidFill>
@@ -2951,8 +2951,8 @@
               <a:noFill/>
             </a:ln>
             <a:extLst>
-              <a:ext uri="{91240B29-F687-4f45-9708-019B960494DF}">
-                <a14:hiddenLine xmlns:a14="http://schemas.microsoft.com/office/drawing/2010/main" xmlns="" w="9525">
+              <a:ext uri="{91240B29-F687-4F45-9708-019B960494DF}">
+                <a14:hiddenLine xmlns:a14="http://schemas.microsoft.com/office/drawing/2010/main" w="9525">
                   <a:solidFill>
                     <a:srgbClr val="000000"/>
                   </a:solidFill>
@@ -3041,8 +3041,8 @@
               <a:noFill/>
             </a:ln>
             <a:extLst>
-              <a:ext uri="{91240B29-F687-4f45-9708-019B960494DF}">
-                <a14:hiddenLine xmlns:a14="http://schemas.microsoft.com/office/drawing/2010/main" xmlns="" w="9525">
+              <a:ext uri="{91240B29-F687-4F45-9708-019B960494DF}">
+                <a14:hiddenLine xmlns:a14="http://schemas.microsoft.com/office/drawing/2010/main" w="9525">
                   <a:solidFill>
                     <a:srgbClr val="000000"/>
                   </a:solidFill>
@@ -3097,8 +3097,8 @@
               <a:noFill/>
             </a:ln>
             <a:extLst>
-              <a:ext uri="{91240B29-F687-4f45-9708-019B960494DF}">
-                <a14:hiddenLine xmlns:a14="http://schemas.microsoft.com/office/drawing/2010/main" xmlns="" w="9525">
+              <a:ext uri="{91240B29-F687-4F45-9708-019B960494DF}">
+                <a14:hiddenLine xmlns:a14="http://schemas.microsoft.com/office/drawing/2010/main" w="9525">
                   <a:solidFill>
                     <a:srgbClr val="000000"/>
                   </a:solidFill>
@@ -3187,8 +3187,8 @@
               <a:noFill/>
             </a:ln>
             <a:extLst>
-              <a:ext uri="{91240B29-F687-4f45-9708-019B960494DF}">
-                <a14:hiddenLine xmlns:a14="http://schemas.microsoft.com/office/drawing/2010/main" xmlns="" w="9525">
+              <a:ext uri="{91240B29-F687-4F45-9708-019B960494DF}">
+                <a14:hiddenLine xmlns:a14="http://schemas.microsoft.com/office/drawing/2010/main" w="9525">
                   <a:solidFill>
                     <a:srgbClr val="000000"/>
                   </a:solidFill>
@@ -3243,8 +3243,8 @@
               <a:noFill/>
             </a:ln>
             <a:extLst>
-              <a:ext uri="{91240B29-F687-4f45-9708-019B960494DF}">
-                <a14:hiddenLine xmlns:a14="http://schemas.microsoft.com/office/drawing/2010/main" xmlns="" w="9525">
+              <a:ext uri="{91240B29-F687-4F45-9708-019B960494DF}">
+                <a14:hiddenLine xmlns:a14="http://schemas.microsoft.com/office/drawing/2010/main" w="9525">
                   <a:solidFill>
                     <a:srgbClr val="000000"/>
                   </a:solidFill>
@@ -3333,8 +3333,8 @@
               <a:noFill/>
             </a:ln>
             <a:extLst>
-              <a:ext uri="{91240B29-F687-4f45-9708-019B960494DF}">
-                <a14:hiddenLine xmlns:a14="http://schemas.microsoft.com/office/drawing/2010/main" xmlns="" w="9525">
+              <a:ext uri="{91240B29-F687-4F45-9708-019B960494DF}">
+                <a14:hiddenLine xmlns:a14="http://schemas.microsoft.com/office/drawing/2010/main" w="9525">
                   <a:solidFill>
                     <a:srgbClr val="000000"/>
                   </a:solidFill>
@@ -3401,8 +3401,8 @@
               <a:noFill/>
             </a:ln>
             <a:extLst>
-              <a:ext uri="{91240B29-F687-4f45-9708-019B960494DF}">
-                <a14:hiddenLine xmlns:a14="http://schemas.microsoft.com/office/drawing/2010/main" xmlns="" w="9525">
+              <a:ext uri="{91240B29-F687-4F45-9708-019B960494DF}">
+                <a14:hiddenLine xmlns:a14="http://schemas.microsoft.com/office/drawing/2010/main" w="9525">
                   <a:solidFill>
                     <a:srgbClr val="000000"/>
                   </a:solidFill>
@@ -3491,8 +3491,8 @@
               <a:noFill/>
             </a:ln>
             <a:extLst>
-              <a:ext uri="{91240B29-F687-4f45-9708-019B960494DF}">
-                <a14:hiddenLine xmlns:a14="http://schemas.microsoft.com/office/drawing/2010/main" xmlns="" w="9525">
+              <a:ext uri="{91240B29-F687-4F45-9708-019B960494DF}">
+                <a14:hiddenLine xmlns:a14="http://schemas.microsoft.com/office/drawing/2010/main" w="9525">
                   <a:solidFill>
                     <a:srgbClr val="000000"/>
                   </a:solidFill>
@@ -3559,8 +3559,8 @@
               <a:noFill/>
             </a:ln>
             <a:extLst>
-              <a:ext uri="{91240B29-F687-4f45-9708-019B960494DF}">
-                <a14:hiddenLine xmlns:a14="http://schemas.microsoft.com/office/drawing/2010/main" xmlns="" w="9525">
+              <a:ext uri="{91240B29-F687-4F45-9708-019B960494DF}">
+                <a14:hiddenLine xmlns:a14="http://schemas.microsoft.com/office/drawing/2010/main" w="9525">
                   <a:solidFill>
                     <a:srgbClr val="000000"/>
                   </a:solidFill>
@@ -3649,8 +3649,8 @@
               <a:noFill/>
             </a:ln>
             <a:extLst>
-              <a:ext uri="{91240B29-F687-4f45-9708-019B960494DF}">
-                <a14:hiddenLine xmlns:a14="http://schemas.microsoft.com/office/drawing/2010/main" xmlns="" w="9525">
+              <a:ext uri="{91240B29-F687-4F45-9708-019B960494DF}">
+                <a14:hiddenLine xmlns:a14="http://schemas.microsoft.com/office/drawing/2010/main" w="9525">
                   <a:solidFill>
                     <a:srgbClr val="000000"/>
                   </a:solidFill>
@@ -3683,8 +3683,8 @@
               <a:noFill/>
             </a:ln>
             <a:extLst>
-              <a:ext uri="{91240B29-F687-4f45-9708-019B960494DF}">
-                <a14:hiddenLine xmlns:a14="http://schemas.microsoft.com/office/drawing/2010/main" xmlns="" w="9525">
+              <a:ext uri="{91240B29-F687-4F45-9708-019B960494DF}">
+                <a14:hiddenLine xmlns:a14="http://schemas.microsoft.com/office/drawing/2010/main" w="9525">
                   <a:solidFill>
                     <a:srgbClr val="000000"/>
                   </a:solidFill>
@@ -3773,8 +3773,8 @@
               <a:noFill/>
             </a:ln>
             <a:extLst>
-              <a:ext uri="{91240B29-F687-4f45-9708-019B960494DF}">
-                <a14:hiddenLine xmlns:a14="http://schemas.microsoft.com/office/drawing/2010/main" xmlns="" w="9525">
+              <a:ext uri="{91240B29-F687-4F45-9708-019B960494DF}">
+                <a14:hiddenLine xmlns:a14="http://schemas.microsoft.com/office/drawing/2010/main" w="9525">
                   <a:solidFill>
                     <a:srgbClr val="000000"/>
                   </a:solidFill>
@@ -3835,8 +3835,8 @@
               <a:noFill/>
             </a:ln>
             <a:extLst>
-              <a:ext uri="{91240B29-F687-4f45-9708-019B960494DF}">
-                <a14:hiddenLine xmlns:a14="http://schemas.microsoft.com/office/drawing/2010/main" xmlns="" w="9525">
+              <a:ext uri="{91240B29-F687-4F45-9708-019B960494DF}">
+                <a14:hiddenLine xmlns:a14="http://schemas.microsoft.com/office/drawing/2010/main" w="9525">
                   <a:solidFill>
                     <a:srgbClr val="000000"/>
                   </a:solidFill>
@@ -3897,8 +3897,8 @@
               <a:noFill/>
             </a:ln>
             <a:extLst>
-              <a:ext uri="{91240B29-F687-4f45-9708-019B960494DF}">
-                <a14:hiddenLine xmlns:a14="http://schemas.microsoft.com/office/drawing/2010/main" xmlns="" w="9525">
+              <a:ext uri="{91240B29-F687-4F45-9708-019B960494DF}">
+                <a14:hiddenLine xmlns:a14="http://schemas.microsoft.com/office/drawing/2010/main" w="9525">
                   <a:solidFill>
                     <a:srgbClr val="000000"/>
                   </a:solidFill>
@@ -3987,8 +3987,8 @@
               <a:noFill/>
             </a:ln>
             <a:extLst>
-              <a:ext uri="{91240B29-F687-4f45-9708-019B960494DF}">
-                <a14:hiddenLine xmlns:a14="http://schemas.microsoft.com/office/drawing/2010/main" xmlns="" w="9525">
+              <a:ext uri="{91240B29-F687-4F45-9708-019B960494DF}">
+                <a14:hiddenLine xmlns:a14="http://schemas.microsoft.com/office/drawing/2010/main" w="9525">
                   <a:solidFill>
                     <a:srgbClr val="000000"/>
                   </a:solidFill>
@@ -4055,8 +4055,8 @@
               <a:noFill/>
             </a:ln>
             <a:extLst>
-              <a:ext uri="{91240B29-F687-4f45-9708-019B960494DF}">
-                <a14:hiddenLine xmlns:a14="http://schemas.microsoft.com/office/drawing/2010/main" xmlns="" w="9525">
+              <a:ext uri="{91240B29-F687-4F45-9708-019B960494DF}">
+                <a14:hiddenLine xmlns:a14="http://schemas.microsoft.com/office/drawing/2010/main" w="9525">
                   <a:solidFill>
                     <a:srgbClr val="000000"/>
                   </a:solidFill>
@@ -4117,8 +4117,8 @@
               <a:noFill/>
             </a:ln>
             <a:extLst>
-              <a:ext uri="{91240B29-F687-4f45-9708-019B960494DF}">
-                <a14:hiddenLine xmlns:a14="http://schemas.microsoft.com/office/drawing/2010/main" xmlns="" w="9525">
+              <a:ext uri="{91240B29-F687-4F45-9708-019B960494DF}">
+                <a14:hiddenLine xmlns:a14="http://schemas.microsoft.com/office/drawing/2010/main" w="9525">
                   <a:solidFill>
                     <a:srgbClr val="000000"/>
                   </a:solidFill>
@@ -4207,8 +4207,8 @@
               <a:noFill/>
             </a:ln>
             <a:extLst>
-              <a:ext uri="{91240B29-F687-4f45-9708-019B960494DF}">
-                <a14:hiddenLine xmlns:a14="http://schemas.microsoft.com/office/drawing/2010/main" xmlns="" w="9525">
+              <a:ext uri="{91240B29-F687-4F45-9708-019B960494DF}">
+                <a14:hiddenLine xmlns:a14="http://schemas.microsoft.com/office/drawing/2010/main" w="9525">
                   <a:solidFill>
                     <a:srgbClr val="000000"/>
                   </a:solidFill>
@@ -4269,8 +4269,8 @@
               <a:noFill/>
             </a:ln>
             <a:extLst>
-              <a:ext uri="{91240B29-F687-4f45-9708-019B960494DF}">
-                <a14:hiddenLine xmlns:a14="http://schemas.microsoft.com/office/drawing/2010/main" xmlns="" w="9525">
+              <a:ext uri="{91240B29-F687-4F45-9708-019B960494DF}">
+                <a14:hiddenLine xmlns:a14="http://schemas.microsoft.com/office/drawing/2010/main" w="9525">
                   <a:solidFill>
                     <a:srgbClr val="000000"/>
                   </a:solidFill>
@@ -4359,8 +4359,8 @@
               <a:noFill/>
             </a:ln>
             <a:extLst>
-              <a:ext uri="{91240B29-F687-4f45-9708-019B960494DF}">
-                <a14:hiddenLine xmlns:a14="http://schemas.microsoft.com/office/drawing/2010/main" xmlns="" w="9525">
+              <a:ext uri="{91240B29-F687-4F45-9708-019B960494DF}">
+                <a14:hiddenLine xmlns:a14="http://schemas.microsoft.com/office/drawing/2010/main" w="9525">
                   <a:solidFill>
                     <a:srgbClr val="000000"/>
                   </a:solidFill>
@@ -4421,8 +4421,8 @@
               <a:noFill/>
             </a:ln>
             <a:extLst>
-              <a:ext uri="{91240B29-F687-4f45-9708-019B960494DF}">
-                <a14:hiddenLine xmlns:a14="http://schemas.microsoft.com/office/drawing/2010/main" xmlns="" w="9525">
+              <a:ext uri="{91240B29-F687-4F45-9708-019B960494DF}">
+                <a14:hiddenLine xmlns:a14="http://schemas.microsoft.com/office/drawing/2010/main" w="9525">
                   <a:solidFill>
                     <a:srgbClr val="000000"/>
                   </a:solidFill>
@@ -4511,8 +4511,8 @@
               <a:noFill/>
             </a:ln>
             <a:extLst>
-              <a:ext uri="{91240B29-F687-4f45-9708-019B960494DF}">
-                <a14:hiddenLine xmlns:a14="http://schemas.microsoft.com/office/drawing/2010/main" xmlns="" w="9525">
+              <a:ext uri="{91240B29-F687-4F45-9708-019B960494DF}">
+                <a14:hiddenLine xmlns:a14="http://schemas.microsoft.com/office/drawing/2010/main" w="9525">
                   <a:solidFill>
                     <a:srgbClr val="000000"/>
                   </a:solidFill>
@@ -4545,8 +4545,8 @@
               <a:noFill/>
             </a:ln>
             <a:extLst>
-              <a:ext uri="{91240B29-F687-4f45-9708-019B960494DF}">
-                <a14:hiddenLine xmlns:a14="http://schemas.microsoft.com/office/drawing/2010/main" xmlns="" w="9525">
+              <a:ext uri="{91240B29-F687-4F45-9708-019B960494DF}">
+                <a14:hiddenLine xmlns:a14="http://schemas.microsoft.com/office/drawing/2010/main" w="9525">
                   <a:solidFill>
                     <a:srgbClr val="000000"/>
                   </a:solidFill>
@@ -4610,8 +4610,8 @@
               <a:noFill/>
             </a:ln>
             <a:extLst>
-              <a:ext uri="{91240B29-F687-4f45-9708-019B960494DF}">
-                <a14:hiddenLine xmlns:a14="http://schemas.microsoft.com/office/drawing/2010/main" xmlns="" w="9525">
+              <a:ext uri="{91240B29-F687-4F45-9708-019B960494DF}">
+                <a14:hiddenLine xmlns:a14="http://schemas.microsoft.com/office/drawing/2010/main" w="9525">
                   <a:solidFill>
                     <a:srgbClr val="000000"/>
                   </a:solidFill>
@@ -4700,8 +4700,8 @@
               <a:noFill/>
             </a:ln>
             <a:extLst>
-              <a:ext uri="{91240B29-F687-4f45-9708-019B960494DF}">
-                <a14:hiddenLine xmlns:a14="http://schemas.microsoft.com/office/drawing/2010/main" xmlns="" w="9525">
+              <a:ext uri="{91240B29-F687-4F45-9708-019B960494DF}">
+                <a14:hiddenLine xmlns:a14="http://schemas.microsoft.com/office/drawing/2010/main" w="9525">
                   <a:solidFill>
                     <a:srgbClr val="000000"/>
                   </a:solidFill>
@@ -4762,8 +4762,8 @@
               <a:noFill/>
             </a:ln>
             <a:extLst>
-              <a:ext uri="{91240B29-F687-4f45-9708-019B960494DF}">
-                <a14:hiddenLine xmlns:a14="http://schemas.microsoft.com/office/drawing/2010/main" xmlns="" w="9525">
+              <a:ext uri="{91240B29-F687-4F45-9708-019B960494DF}">
+                <a14:hiddenLine xmlns:a14="http://schemas.microsoft.com/office/drawing/2010/main" w="9525">
                   <a:solidFill>
                     <a:srgbClr val="000000"/>
                   </a:solidFill>
@@ -4852,8 +4852,8 @@
               <a:noFill/>
             </a:ln>
             <a:extLst>
-              <a:ext uri="{91240B29-F687-4f45-9708-019B960494DF}">
-                <a14:hiddenLine xmlns:a14="http://schemas.microsoft.com/office/drawing/2010/main" xmlns="" w="9525">
+              <a:ext uri="{91240B29-F687-4F45-9708-019B960494DF}">
+                <a14:hiddenLine xmlns:a14="http://schemas.microsoft.com/office/drawing/2010/main" w="9525">
                   <a:solidFill>
                     <a:srgbClr val="000000"/>
                   </a:solidFill>
@@ -4942,8 +4942,8 @@
               <a:noFill/>
             </a:ln>
             <a:extLst>
-              <a:ext uri="{91240B29-F687-4f45-9708-019B960494DF}">
-                <a14:hiddenLine xmlns:a14="http://schemas.microsoft.com/office/drawing/2010/main" xmlns="" w="9525">
+              <a:ext uri="{91240B29-F687-4F45-9708-019B960494DF}">
+                <a14:hiddenLine xmlns:a14="http://schemas.microsoft.com/office/drawing/2010/main" w="9525">
                   <a:solidFill>
                     <a:srgbClr val="000000"/>
                   </a:solidFill>
@@ -5007,8 +5007,8 @@
               <a:noFill/>
             </a:ln>
             <a:extLst>
-              <a:ext uri="{91240B29-F687-4f45-9708-019B960494DF}">
-                <a14:hiddenLine xmlns:a14="http://schemas.microsoft.com/office/drawing/2010/main" xmlns="" w="9525">
+              <a:ext uri="{91240B29-F687-4F45-9708-019B960494DF}">
+                <a14:hiddenLine xmlns:a14="http://schemas.microsoft.com/office/drawing/2010/main" w="9525">
                   <a:solidFill>
                     <a:srgbClr val="000000"/>
                   </a:solidFill>
@@ -5069,8 +5069,8 @@
               <a:noFill/>
             </a:ln>
             <a:extLst>
-              <a:ext uri="{91240B29-F687-4f45-9708-019B960494DF}">
-                <a14:hiddenLine xmlns:a14="http://schemas.microsoft.com/office/drawing/2010/main" xmlns="" w="9525">
+              <a:ext uri="{91240B29-F687-4F45-9708-019B960494DF}">
+                <a14:hiddenLine xmlns:a14="http://schemas.microsoft.com/office/drawing/2010/main" w="9525">
                   <a:solidFill>
                     <a:srgbClr val="000000"/>
                   </a:solidFill>
@@ -5159,8 +5159,8 @@
               <a:noFill/>
             </a:ln>
             <a:extLst>
-              <a:ext uri="{91240B29-F687-4f45-9708-019B960494DF}">
-                <a14:hiddenLine xmlns:a14="http://schemas.microsoft.com/office/drawing/2010/main" xmlns="" w="9525">
+              <a:ext uri="{91240B29-F687-4F45-9708-019B960494DF}">
+                <a14:hiddenLine xmlns:a14="http://schemas.microsoft.com/office/drawing/2010/main" w="9525">
                   <a:solidFill>
                     <a:srgbClr val="000000"/>
                   </a:solidFill>
@@ -5249,8 +5249,8 @@
               <a:noFill/>
             </a:ln>
             <a:extLst>
-              <a:ext uri="{91240B29-F687-4f45-9708-019B960494DF}">
-                <a14:hiddenLine xmlns:a14="http://schemas.microsoft.com/office/drawing/2010/main" xmlns="" w="9525">
+              <a:ext uri="{91240B29-F687-4F45-9708-019B960494DF}">
+                <a14:hiddenLine xmlns:a14="http://schemas.microsoft.com/office/drawing/2010/main" w="9525">
                   <a:solidFill>
                     <a:srgbClr val="000000"/>
                   </a:solidFill>
@@ -5311,8 +5311,8 @@
               <a:noFill/>
             </a:ln>
             <a:extLst>
-              <a:ext uri="{91240B29-F687-4f45-9708-019B960494DF}">
-                <a14:hiddenLine xmlns:a14="http://schemas.microsoft.com/office/drawing/2010/main" xmlns="" w="9525">
+              <a:ext uri="{91240B29-F687-4F45-9708-019B960494DF}">
+                <a14:hiddenLine xmlns:a14="http://schemas.microsoft.com/office/drawing/2010/main" w="9525">
                   <a:solidFill>
                     <a:srgbClr val="000000"/>
                   </a:solidFill>
@@ -5431,8 +5431,8 @@
               <a:noFill/>
             </a:ln>
             <a:extLst>
-              <a:ext uri="{91240B29-F687-4f45-9708-019B960494DF}">
-                <a14:hiddenLine xmlns:a14="http://schemas.microsoft.com/office/drawing/2010/main" xmlns="" w="9525">
+              <a:ext uri="{91240B29-F687-4F45-9708-019B960494DF}">
+                <a14:hiddenLine xmlns:a14="http://schemas.microsoft.com/office/drawing/2010/main" w="9525">
                   <a:solidFill>
                     <a:srgbClr val="000000"/>
                   </a:solidFill>
@@ -5499,8 +5499,8 @@
               <a:noFill/>
             </a:ln>
             <a:extLst>
-              <a:ext uri="{91240B29-F687-4f45-9708-019B960494DF}">
-                <a14:hiddenLine xmlns:a14="http://schemas.microsoft.com/office/drawing/2010/main" xmlns="" w="9525">
+              <a:ext uri="{91240B29-F687-4F45-9708-019B960494DF}">
+                <a14:hiddenLine xmlns:a14="http://schemas.microsoft.com/office/drawing/2010/main" w="9525">
                   <a:solidFill>
                     <a:srgbClr val="000000"/>
                   </a:solidFill>
@@ -5589,8 +5589,8 @@
               <a:noFill/>
             </a:ln>
             <a:extLst>
-              <a:ext uri="{91240B29-F687-4f45-9708-019B960494DF}">
-                <a14:hiddenLine xmlns:a14="http://schemas.microsoft.com/office/drawing/2010/main" xmlns="" w="9525">
+              <a:ext uri="{91240B29-F687-4F45-9708-019B960494DF}">
+                <a14:hiddenLine xmlns:a14="http://schemas.microsoft.com/office/drawing/2010/main" w="9525">
                   <a:solidFill>
                     <a:srgbClr val="000000"/>
                   </a:solidFill>
@@ -5730,7 +5730,7 @@
           <a:p>
             <a:fld id="{48A87A34-81AB-432B-8DAE-1953F412C126}" type="datetimeFigureOut">
               <a:rPr lang="en-US" smtClean="0"/>
-              <a:t>2/14/2016</a:t>
+              <a:t>2/16/2016</a:t>
             </a:fld>
             <a:endParaRPr lang="en-US" dirty="0"/>
           </a:p>
@@ -5997,7 +5997,7 @@
           <a:p>
             <a:fld id="{48A87A34-81AB-432B-8DAE-1953F412C126}" type="datetimeFigureOut">
               <a:rPr lang="en-US" smtClean="0"/>
-              <a:t>2/14/2016</a:t>
+              <a:t>2/16/2016</a:t>
             </a:fld>
             <a:endParaRPr lang="en-US" dirty="0"/>
           </a:p>
@@ -6193,7 +6193,7 @@
           <a:p>
             <a:fld id="{48A87A34-81AB-432B-8DAE-1953F412C126}" type="datetimeFigureOut">
               <a:rPr lang="en-US" smtClean="0"/>
-              <a:t>2/14/2016</a:t>
+              <a:t>2/16/2016</a:t>
             </a:fld>
             <a:endParaRPr lang="en-US" dirty="0"/>
           </a:p>
@@ -6456,7 +6456,7 @@
           <a:p>
             <a:fld id="{48A87A34-81AB-432B-8DAE-1953F412C126}" type="datetimeFigureOut">
               <a:rPr lang="en-US" smtClean="0"/>
-              <a:t>2/14/2016</a:t>
+              <a:t>2/16/2016</a:t>
             </a:fld>
             <a:endParaRPr lang="en-US" dirty="0"/>
           </a:p>
@@ -6890,7 +6890,7 @@
           <a:p>
             <a:fld id="{48A87A34-81AB-432B-8DAE-1953F412C126}" type="datetimeFigureOut">
               <a:rPr lang="en-US" smtClean="0"/>
-              <a:t>2/14/2016</a:t>
+              <a:t>2/16/2016</a:t>
             </a:fld>
             <a:endParaRPr lang="en-US" dirty="0"/>
           </a:p>
@@ -7436,7 +7436,7 @@
           <a:p>
             <a:fld id="{48A87A34-81AB-432B-8DAE-1953F412C126}" type="datetimeFigureOut">
               <a:rPr lang="en-US" smtClean="0"/>
-              <a:t>2/14/2016</a:t>
+              <a:t>2/16/2016</a:t>
             </a:fld>
             <a:endParaRPr lang="en-US" dirty="0"/>
           </a:p>
@@ -8156,7 +8156,7 @@
           <a:p>
             <a:fld id="{48A87A34-81AB-432B-8DAE-1953F412C126}" type="datetimeFigureOut">
               <a:rPr lang="en-US" smtClean="0"/>
-              <a:t>2/14/2016</a:t>
+              <a:t>2/16/2016</a:t>
             </a:fld>
             <a:endParaRPr lang="en-US" dirty="0"/>
           </a:p>
@@ -8330,7 +8330,7 @@
           <a:p>
             <a:fld id="{48A87A34-81AB-432B-8DAE-1953F412C126}" type="datetimeFigureOut">
               <a:rPr lang="en-US" smtClean="0"/>
-              <a:t>2/14/2016</a:t>
+              <a:t>2/16/2016</a:t>
             </a:fld>
             <a:endParaRPr lang="en-US" dirty="0"/>
           </a:p>
@@ -8510,7 +8510,7 @@
           <a:p>
             <a:fld id="{48A87A34-81AB-432B-8DAE-1953F412C126}" type="datetimeFigureOut">
               <a:rPr lang="en-US" smtClean="0"/>
-              <a:t>2/14/2016</a:t>
+              <a:t>2/16/2016</a:t>
             </a:fld>
             <a:endParaRPr lang="en-US" dirty="0"/>
           </a:p>
@@ -8695,7 +8695,7 @@
           <a:p>
             <a:fld id="{48A87A34-81AB-432B-8DAE-1953F412C126}" type="datetimeFigureOut">
               <a:rPr lang="en-US" smtClean="0"/>
-              <a:t>2/14/2016</a:t>
+              <a:t>2/16/2016</a:t>
             </a:fld>
             <a:endParaRPr lang="en-US" dirty="0"/>
           </a:p>
@@ -8955,7 +8955,7 @@
           <a:p>
             <a:fld id="{48A87A34-81AB-432B-8DAE-1953F412C126}" type="datetimeFigureOut">
               <a:rPr lang="en-US" smtClean="0"/>
-              <a:t>2/14/2016</a:t>
+              <a:t>2/16/2016</a:t>
             </a:fld>
             <a:endParaRPr lang="en-US" dirty="0"/>
           </a:p>
@@ -9187,7 +9187,7 @@
           <a:p>
             <a:fld id="{48A87A34-81AB-432B-8DAE-1953F412C126}" type="datetimeFigureOut">
               <a:rPr lang="en-US" smtClean="0"/>
-              <a:t>2/14/2016</a:t>
+              <a:t>2/16/2016</a:t>
             </a:fld>
             <a:endParaRPr lang="en-US" dirty="0"/>
           </a:p>
@@ -9568,7 +9568,7 @@
           <a:p>
             <a:fld id="{48A87A34-81AB-432B-8DAE-1953F412C126}" type="datetimeFigureOut">
               <a:rPr lang="en-US" smtClean="0"/>
-              <a:t>2/14/2016</a:t>
+              <a:t>2/16/2016</a:t>
             </a:fld>
             <a:endParaRPr lang="en-US" dirty="0"/>
           </a:p>
@@ -9686,7 +9686,7 @@
           <a:p>
             <a:fld id="{48A87A34-81AB-432B-8DAE-1953F412C126}" type="datetimeFigureOut">
               <a:rPr lang="en-US" smtClean="0"/>
-              <a:t>2/14/2016</a:t>
+              <a:t>2/16/2016</a:t>
             </a:fld>
             <a:endParaRPr lang="en-US" dirty="0"/>
           </a:p>
@@ -9781,7 +9781,7 @@
           <a:p>
             <a:fld id="{48A87A34-81AB-432B-8DAE-1953F412C126}" type="datetimeFigureOut">
               <a:rPr lang="en-US" smtClean="0"/>
-              <a:t>2/14/2016</a:t>
+              <a:t>2/16/2016</a:t>
             </a:fld>
             <a:endParaRPr lang="en-US" dirty="0"/>
           </a:p>
@@ -10030,7 +10030,7 @@
           <a:p>
             <a:fld id="{48A87A34-81AB-432B-8DAE-1953F412C126}" type="datetimeFigureOut">
               <a:rPr lang="en-US" smtClean="0"/>
-              <a:t>2/14/2016</a:t>
+              <a:t>2/16/2016</a:t>
             </a:fld>
             <a:endParaRPr lang="en-US" dirty="0"/>
           </a:p>
@@ -10282,7 +10282,7 @@
           <a:p>
             <a:fld id="{48A87A34-81AB-432B-8DAE-1953F412C126}" type="datetimeFigureOut">
               <a:rPr lang="en-US" smtClean="0"/>
-              <a:t>2/14/2016</a:t>
+              <a:t>2/16/2016</a:t>
             </a:fld>
             <a:endParaRPr lang="en-US" dirty="0"/>
           </a:p>
@@ -10404,8 +10404,8 @@
           </a:prstGeom>
           <a:noFill/>
           <a:extLst>
-            <a:ext uri="{909E8E84-426E-40dd-AFC4-6F175D3DCCD1}">
-              <a14:hiddenFill xmlns:a14="http://schemas.microsoft.com/office/drawing/2010/main" xmlns="">
+            <a:ext uri="{909E8E84-426E-40DD-AFC4-6F175D3DCCD1}">
+              <a14:hiddenFill xmlns:a14="http://schemas.microsoft.com/office/drawing/2010/main">
                 <a:solidFill>
                   <a:srgbClr val="FFFFFF"/>
                 </a:solidFill>
@@ -10478,8 +10478,8 @@
                 <a:noFill/>
               </a:ln>
               <a:extLst>
-                <a:ext uri="{91240B29-F687-4f45-9708-019B960494DF}">
-                  <a14:hiddenLine xmlns:a14="http://schemas.microsoft.com/office/drawing/2010/main" xmlns="" w="9525">
+                <a:ext uri="{91240B29-F687-4F45-9708-019B960494DF}">
+                  <a14:hiddenLine xmlns:a14="http://schemas.microsoft.com/office/drawing/2010/main" w="9525">
                     <a:solidFill>
                       <a:srgbClr val="000000"/>
                     </a:solidFill>
@@ -10568,8 +10568,8 @@
                 <a:noFill/>
               </a:ln>
               <a:extLst>
-                <a:ext uri="{91240B29-F687-4f45-9708-019B960494DF}">
-                  <a14:hiddenLine xmlns:a14="http://schemas.microsoft.com/office/drawing/2010/main" xmlns="" w="9525">
+                <a:ext uri="{91240B29-F687-4F45-9708-019B960494DF}">
+                  <a14:hiddenLine xmlns:a14="http://schemas.microsoft.com/office/drawing/2010/main" w="9525">
                     <a:solidFill>
                       <a:srgbClr val="000000"/>
                     </a:solidFill>
@@ -10658,8 +10658,8 @@
                 <a:noFill/>
               </a:ln>
               <a:extLst>
-                <a:ext uri="{91240B29-F687-4f45-9708-019B960494DF}">
-                  <a14:hiddenLine xmlns:a14="http://schemas.microsoft.com/office/drawing/2010/main" xmlns="" w="9525">
+                <a:ext uri="{91240B29-F687-4F45-9708-019B960494DF}">
+                  <a14:hiddenLine xmlns:a14="http://schemas.microsoft.com/office/drawing/2010/main" w="9525">
                     <a:solidFill>
                       <a:srgbClr val="000000"/>
                     </a:solidFill>
@@ -10720,8 +10720,8 @@
                 <a:noFill/>
               </a:ln>
               <a:extLst>
-                <a:ext uri="{91240B29-F687-4f45-9708-019B960494DF}">
-                  <a14:hiddenLine xmlns:a14="http://schemas.microsoft.com/office/drawing/2010/main" xmlns="" w="9525">
+                <a:ext uri="{91240B29-F687-4F45-9708-019B960494DF}">
+                  <a14:hiddenLine xmlns:a14="http://schemas.microsoft.com/office/drawing/2010/main" w="9525">
                     <a:solidFill>
                       <a:srgbClr val="000000"/>
                     </a:solidFill>
@@ -10810,8 +10810,8 @@
                 <a:noFill/>
               </a:ln>
               <a:extLst>
-                <a:ext uri="{91240B29-F687-4f45-9708-019B960494DF}">
-                  <a14:hiddenLine xmlns:a14="http://schemas.microsoft.com/office/drawing/2010/main" xmlns="" w="9525">
+                <a:ext uri="{91240B29-F687-4F45-9708-019B960494DF}">
+                  <a14:hiddenLine xmlns:a14="http://schemas.microsoft.com/office/drawing/2010/main" w="9525">
                     <a:solidFill>
                       <a:srgbClr val="000000"/>
                     </a:solidFill>
@@ -10872,8 +10872,8 @@
                 <a:noFill/>
               </a:ln>
               <a:extLst>
-                <a:ext uri="{91240B29-F687-4f45-9708-019B960494DF}">
-                  <a14:hiddenLine xmlns:a14="http://schemas.microsoft.com/office/drawing/2010/main" xmlns="" w="9525">
+                <a:ext uri="{91240B29-F687-4F45-9708-019B960494DF}">
+                  <a14:hiddenLine xmlns:a14="http://schemas.microsoft.com/office/drawing/2010/main" w="9525">
                     <a:solidFill>
                       <a:srgbClr val="000000"/>
                     </a:solidFill>
@@ -10934,8 +10934,8 @@
                 <a:noFill/>
               </a:ln>
               <a:extLst>
-                <a:ext uri="{91240B29-F687-4f45-9708-019B960494DF}">
-                  <a14:hiddenLine xmlns:a14="http://schemas.microsoft.com/office/drawing/2010/main" xmlns="" w="9525">
+                <a:ext uri="{91240B29-F687-4F45-9708-019B960494DF}">
+                  <a14:hiddenLine xmlns:a14="http://schemas.microsoft.com/office/drawing/2010/main" w="9525">
                     <a:solidFill>
                       <a:srgbClr val="000000"/>
                     </a:solidFill>
@@ -11024,8 +11024,8 @@
                 <a:noFill/>
               </a:ln>
               <a:extLst>
-                <a:ext uri="{91240B29-F687-4f45-9708-019B960494DF}">
-                  <a14:hiddenLine xmlns:a14="http://schemas.microsoft.com/office/drawing/2010/main" xmlns="" w="9525">
+                <a:ext uri="{91240B29-F687-4F45-9708-019B960494DF}">
+                  <a14:hiddenLine xmlns:a14="http://schemas.microsoft.com/office/drawing/2010/main" w="9525">
                     <a:solidFill>
                       <a:srgbClr val="000000"/>
                     </a:solidFill>
@@ -11114,8 +11114,8 @@
                 <a:noFill/>
               </a:ln>
               <a:extLst>
-                <a:ext uri="{91240B29-F687-4f45-9708-019B960494DF}">
-                  <a14:hiddenLine xmlns:a14="http://schemas.microsoft.com/office/drawing/2010/main" xmlns="" w="9525">
+                <a:ext uri="{91240B29-F687-4F45-9708-019B960494DF}">
+                  <a14:hiddenLine xmlns:a14="http://schemas.microsoft.com/office/drawing/2010/main" w="9525">
                     <a:solidFill>
                       <a:srgbClr val="000000"/>
                     </a:solidFill>
@@ -11176,8 +11176,8 @@
                 <a:noFill/>
               </a:ln>
               <a:extLst>
-                <a:ext uri="{91240B29-F687-4f45-9708-019B960494DF}">
-                  <a14:hiddenLine xmlns:a14="http://schemas.microsoft.com/office/drawing/2010/main" xmlns="" w="9525">
+                <a:ext uri="{91240B29-F687-4F45-9708-019B960494DF}">
+                  <a14:hiddenLine xmlns:a14="http://schemas.microsoft.com/office/drawing/2010/main" w="9525">
                     <a:solidFill>
                       <a:srgbClr val="000000"/>
                     </a:solidFill>
@@ -11286,8 +11286,8 @@
                 <a:noFill/>
               </a:ln>
               <a:extLst>
-                <a:ext uri="{91240B29-F687-4f45-9708-019B960494DF}">
-                  <a14:hiddenLine xmlns:a14="http://schemas.microsoft.com/office/drawing/2010/main" xmlns="" w="9525">
+                <a:ext uri="{91240B29-F687-4F45-9708-019B960494DF}">
+                  <a14:hiddenLine xmlns:a14="http://schemas.microsoft.com/office/drawing/2010/main" w="9525">
                     <a:solidFill>
                       <a:srgbClr val="000000"/>
                     </a:solidFill>
@@ -11370,8 +11370,8 @@
                 <a:noFill/>
               </a:ln>
               <a:extLst>
-                <a:ext uri="{91240B29-F687-4f45-9708-019B960494DF}">
-                  <a14:hiddenLine xmlns:a14="http://schemas.microsoft.com/office/drawing/2010/main" xmlns="" w="9525">
+                <a:ext uri="{91240B29-F687-4F45-9708-019B960494DF}">
+                  <a14:hiddenLine xmlns:a14="http://schemas.microsoft.com/office/drawing/2010/main" w="9525">
                     <a:solidFill>
                       <a:srgbClr val="000000"/>
                     </a:solidFill>
@@ -11432,8 +11432,8 @@
                 <a:noFill/>
               </a:ln>
               <a:extLst>
-                <a:ext uri="{91240B29-F687-4f45-9708-019B960494DF}">
-                  <a14:hiddenLine xmlns:a14="http://schemas.microsoft.com/office/drawing/2010/main" xmlns="" w="9525">
+                <a:ext uri="{91240B29-F687-4F45-9708-019B960494DF}">
+                  <a14:hiddenLine xmlns:a14="http://schemas.microsoft.com/office/drawing/2010/main" w="9525">
                     <a:solidFill>
                       <a:srgbClr val="000000"/>
                     </a:solidFill>
@@ -11494,8 +11494,8 @@
                 <a:noFill/>
               </a:ln>
               <a:extLst>
-                <a:ext uri="{91240B29-F687-4f45-9708-019B960494DF}">
-                  <a14:hiddenLine xmlns:a14="http://schemas.microsoft.com/office/drawing/2010/main" xmlns="" w="9525">
+                <a:ext uri="{91240B29-F687-4F45-9708-019B960494DF}">
+                  <a14:hiddenLine xmlns:a14="http://schemas.microsoft.com/office/drawing/2010/main" w="9525">
                     <a:solidFill>
                       <a:srgbClr val="000000"/>
                     </a:solidFill>
@@ -11584,8 +11584,8 @@
                 <a:noFill/>
               </a:ln>
               <a:extLst>
-                <a:ext uri="{91240B29-F687-4f45-9708-019B960494DF}">
-                  <a14:hiddenLine xmlns:a14="http://schemas.microsoft.com/office/drawing/2010/main" xmlns="" w="9525">
+                <a:ext uri="{91240B29-F687-4F45-9708-019B960494DF}">
+                  <a14:hiddenLine xmlns:a14="http://schemas.microsoft.com/office/drawing/2010/main" w="9525">
                     <a:solidFill>
                       <a:srgbClr val="000000"/>
                     </a:solidFill>
@@ -11618,8 +11618,8 @@
                 <a:noFill/>
               </a:ln>
               <a:extLst>
-                <a:ext uri="{91240B29-F687-4f45-9708-019B960494DF}">
-                  <a14:hiddenLine xmlns:a14="http://schemas.microsoft.com/office/drawing/2010/main" xmlns="" w="9525">
+                <a:ext uri="{91240B29-F687-4F45-9708-019B960494DF}">
+                  <a14:hiddenLine xmlns:a14="http://schemas.microsoft.com/office/drawing/2010/main" w="9525">
                     <a:solidFill>
                       <a:srgbClr val="000000"/>
                     </a:solidFill>
@@ -11683,8 +11683,8 @@
                 <a:noFill/>
               </a:ln>
               <a:extLst>
-                <a:ext uri="{91240B29-F687-4f45-9708-019B960494DF}">
-                  <a14:hiddenLine xmlns:a14="http://schemas.microsoft.com/office/drawing/2010/main" xmlns="" w="9525">
+                <a:ext uri="{91240B29-F687-4F45-9708-019B960494DF}">
+                  <a14:hiddenLine xmlns:a14="http://schemas.microsoft.com/office/drawing/2010/main" w="9525">
                     <a:solidFill>
                       <a:srgbClr val="000000"/>
                     </a:solidFill>
@@ -11773,8 +11773,8 @@
                 <a:noFill/>
               </a:ln>
               <a:extLst>
-                <a:ext uri="{91240B29-F687-4f45-9708-019B960494DF}">
-                  <a14:hiddenLine xmlns:a14="http://schemas.microsoft.com/office/drawing/2010/main" xmlns="" w="9525">
+                <a:ext uri="{91240B29-F687-4F45-9708-019B960494DF}">
+                  <a14:hiddenLine xmlns:a14="http://schemas.microsoft.com/office/drawing/2010/main" w="9525">
                     <a:solidFill>
                       <a:srgbClr val="000000"/>
                     </a:solidFill>
@@ -11835,8 +11835,8 @@
                 <a:noFill/>
               </a:ln>
               <a:extLst>
-                <a:ext uri="{91240B29-F687-4f45-9708-019B960494DF}">
-                  <a14:hiddenLine xmlns:a14="http://schemas.microsoft.com/office/drawing/2010/main" xmlns="" w="9525">
+                <a:ext uri="{91240B29-F687-4F45-9708-019B960494DF}">
+                  <a14:hiddenLine xmlns:a14="http://schemas.microsoft.com/office/drawing/2010/main" w="9525">
                     <a:solidFill>
                       <a:srgbClr val="000000"/>
                     </a:solidFill>
@@ -11925,8 +11925,8 @@
                 <a:noFill/>
               </a:ln>
               <a:extLst>
-                <a:ext uri="{91240B29-F687-4f45-9708-019B960494DF}">
-                  <a14:hiddenLine xmlns:a14="http://schemas.microsoft.com/office/drawing/2010/main" xmlns="" w="9525">
+                <a:ext uri="{91240B29-F687-4F45-9708-019B960494DF}">
+                  <a14:hiddenLine xmlns:a14="http://schemas.microsoft.com/office/drawing/2010/main" w="9525">
                     <a:solidFill>
                       <a:srgbClr val="000000"/>
                     </a:solidFill>
@@ -11990,8 +11990,8 @@
                 <a:noFill/>
               </a:ln>
               <a:extLst>
-                <a:ext uri="{91240B29-F687-4f45-9708-019B960494DF}">
-                  <a14:hiddenLine xmlns:a14="http://schemas.microsoft.com/office/drawing/2010/main" xmlns="" w="9525">
+                <a:ext uri="{91240B29-F687-4F45-9708-019B960494DF}">
+                  <a14:hiddenLine xmlns:a14="http://schemas.microsoft.com/office/drawing/2010/main" w="9525">
                     <a:solidFill>
                       <a:srgbClr val="000000"/>
                     </a:solidFill>
@@ -12052,8 +12052,8 @@
                 <a:noFill/>
               </a:ln>
               <a:extLst>
-                <a:ext uri="{91240B29-F687-4f45-9708-019B960494DF}">
-                  <a14:hiddenLine xmlns:a14="http://schemas.microsoft.com/office/drawing/2010/main" xmlns="" w="9525">
+                <a:ext uri="{91240B29-F687-4F45-9708-019B960494DF}">
+                  <a14:hiddenLine xmlns:a14="http://schemas.microsoft.com/office/drawing/2010/main" w="9525">
                     <a:solidFill>
                       <a:srgbClr val="000000"/>
                     </a:solidFill>
@@ -12142,8 +12142,8 @@
                 <a:noFill/>
               </a:ln>
               <a:extLst>
-                <a:ext uri="{91240B29-F687-4f45-9708-019B960494DF}">
-                  <a14:hiddenLine xmlns:a14="http://schemas.microsoft.com/office/drawing/2010/main" xmlns="" w="9525">
+                <a:ext uri="{91240B29-F687-4F45-9708-019B960494DF}">
+                  <a14:hiddenLine xmlns:a14="http://schemas.microsoft.com/office/drawing/2010/main" w="9525">
                     <a:solidFill>
                       <a:srgbClr val="000000"/>
                     </a:solidFill>
@@ -12232,8 +12232,8 @@
                 <a:noFill/>
               </a:ln>
               <a:extLst>
-                <a:ext uri="{91240B29-F687-4f45-9708-019B960494DF}">
-                  <a14:hiddenLine xmlns:a14="http://schemas.microsoft.com/office/drawing/2010/main" xmlns="" w="9525">
+                <a:ext uri="{91240B29-F687-4F45-9708-019B960494DF}">
+                  <a14:hiddenLine xmlns:a14="http://schemas.microsoft.com/office/drawing/2010/main" w="9525">
                     <a:solidFill>
                       <a:srgbClr val="000000"/>
                     </a:solidFill>
@@ -12297,8 +12297,8 @@
                 <a:noFill/>
               </a:ln>
               <a:extLst>
-                <a:ext uri="{91240B29-F687-4f45-9708-019B960494DF}">
-                  <a14:hiddenLine xmlns:a14="http://schemas.microsoft.com/office/drawing/2010/main" xmlns="" w="9525">
+                <a:ext uri="{91240B29-F687-4F45-9708-019B960494DF}">
+                  <a14:hiddenLine xmlns:a14="http://schemas.microsoft.com/office/drawing/2010/main" w="9525">
                     <a:solidFill>
                       <a:srgbClr val="000000"/>
                     </a:solidFill>
@@ -12417,8 +12417,8 @@
                 <a:noFill/>
               </a:ln>
               <a:extLst>
-                <a:ext uri="{91240B29-F687-4f45-9708-019B960494DF}">
-                  <a14:hiddenLine xmlns:a14="http://schemas.microsoft.com/office/drawing/2010/main" xmlns="" w="9525">
+                <a:ext uri="{91240B29-F687-4F45-9708-019B960494DF}">
+                  <a14:hiddenLine xmlns:a14="http://schemas.microsoft.com/office/drawing/2010/main" w="9525">
                     <a:solidFill>
                       <a:srgbClr val="000000"/>
                     </a:solidFill>
@@ -12515,8 +12515,8 @@
                 <a:noFill/>
               </a:ln>
               <a:extLst>
-                <a:ext uri="{91240B29-F687-4f45-9708-019B960494DF}">
-                  <a14:hiddenLine xmlns:a14="http://schemas.microsoft.com/office/drawing/2010/main" xmlns="" w="9525">
+                <a:ext uri="{91240B29-F687-4F45-9708-019B960494DF}">
+                  <a14:hiddenLine xmlns:a14="http://schemas.microsoft.com/office/drawing/2010/main" w="9525">
                     <a:solidFill>
                       <a:srgbClr val="000000"/>
                     </a:solidFill>
@@ -12630,8 +12630,8 @@
                 <a:noFill/>
               </a:ln>
               <a:extLst>
-                <a:ext uri="{91240B29-F687-4f45-9708-019B960494DF}">
-                  <a14:hiddenLine xmlns:a14="http://schemas.microsoft.com/office/drawing/2010/main" xmlns="" w="9525">
+                <a:ext uri="{91240B29-F687-4F45-9708-019B960494DF}">
+                  <a14:hiddenLine xmlns:a14="http://schemas.microsoft.com/office/drawing/2010/main" w="9525">
                     <a:solidFill>
                       <a:srgbClr val="000000"/>
                     </a:solidFill>
@@ -12720,8 +12720,8 @@
                 <a:noFill/>
               </a:ln>
               <a:extLst>
-                <a:ext uri="{91240B29-F687-4f45-9708-019B960494DF}">
-                  <a14:hiddenLine xmlns:a14="http://schemas.microsoft.com/office/drawing/2010/main" xmlns="" w="9525">
+                <a:ext uri="{91240B29-F687-4F45-9708-019B960494DF}">
+                  <a14:hiddenLine xmlns:a14="http://schemas.microsoft.com/office/drawing/2010/main" w="9525">
                     <a:solidFill>
                       <a:srgbClr val="000000"/>
                     </a:solidFill>
@@ -12785,8 +12785,8 @@
                 <a:noFill/>
               </a:ln>
               <a:extLst>
-                <a:ext uri="{91240B29-F687-4f45-9708-019B960494DF}">
-                  <a14:hiddenLine xmlns:a14="http://schemas.microsoft.com/office/drawing/2010/main" xmlns="" w="9525">
+                <a:ext uri="{91240B29-F687-4F45-9708-019B960494DF}">
+                  <a14:hiddenLine xmlns:a14="http://schemas.microsoft.com/office/drawing/2010/main" w="9525">
                     <a:solidFill>
                       <a:srgbClr val="000000"/>
                     </a:solidFill>
@@ -12875,8 +12875,8 @@
                 <a:noFill/>
               </a:ln>
               <a:extLst>
-                <a:ext uri="{91240B29-F687-4f45-9708-019B960494DF}">
-                  <a14:hiddenLine xmlns:a14="http://schemas.microsoft.com/office/drawing/2010/main" xmlns="" w="9525">
+                <a:ext uri="{91240B29-F687-4F45-9708-019B960494DF}">
+                  <a14:hiddenLine xmlns:a14="http://schemas.microsoft.com/office/drawing/2010/main" w="9525">
                     <a:solidFill>
                       <a:srgbClr val="000000"/>
                     </a:solidFill>
@@ -12943,8 +12943,8 @@
                 <a:noFill/>
               </a:ln>
               <a:extLst>
-                <a:ext uri="{91240B29-F687-4f45-9708-019B960494DF}">
-                  <a14:hiddenLine xmlns:a14="http://schemas.microsoft.com/office/drawing/2010/main" xmlns="" w="9525">
+                <a:ext uri="{91240B29-F687-4F45-9708-019B960494DF}">
+                  <a14:hiddenLine xmlns:a14="http://schemas.microsoft.com/office/drawing/2010/main" w="9525">
                     <a:solidFill>
                       <a:srgbClr val="000000"/>
                     </a:solidFill>
@@ -13033,8 +13033,8 @@
                 <a:noFill/>
               </a:ln>
               <a:extLst>
-                <a:ext uri="{91240B29-F687-4f45-9708-019B960494DF}">
-                  <a14:hiddenLine xmlns:a14="http://schemas.microsoft.com/office/drawing/2010/main" xmlns="" w="9525">
+                <a:ext uri="{91240B29-F687-4F45-9708-019B960494DF}">
+                  <a14:hiddenLine xmlns:a14="http://schemas.microsoft.com/office/drawing/2010/main" w="9525">
                     <a:solidFill>
                       <a:srgbClr val="000000"/>
                     </a:solidFill>
@@ -13101,8 +13101,8 @@
                 <a:noFill/>
               </a:ln>
               <a:extLst>
-                <a:ext uri="{91240B29-F687-4f45-9708-019B960494DF}">
-                  <a14:hiddenLine xmlns:a14="http://schemas.microsoft.com/office/drawing/2010/main" xmlns="" w="9525">
+                <a:ext uri="{91240B29-F687-4F45-9708-019B960494DF}">
+                  <a14:hiddenLine xmlns:a14="http://schemas.microsoft.com/office/drawing/2010/main" w="9525">
                     <a:solidFill>
                       <a:srgbClr val="000000"/>
                     </a:solidFill>
@@ -13191,8 +13191,8 @@
                 <a:noFill/>
               </a:ln>
               <a:extLst>
-                <a:ext uri="{91240B29-F687-4f45-9708-019B960494DF}">
-                  <a14:hiddenLine xmlns:a14="http://schemas.microsoft.com/office/drawing/2010/main" xmlns="" w="9525">
+                <a:ext uri="{91240B29-F687-4F45-9708-019B960494DF}">
+                  <a14:hiddenLine xmlns:a14="http://schemas.microsoft.com/office/drawing/2010/main" w="9525">
                     <a:solidFill>
                       <a:srgbClr val="000000"/>
                     </a:solidFill>
@@ -13225,8 +13225,8 @@
                 <a:noFill/>
               </a:ln>
               <a:extLst>
-                <a:ext uri="{91240B29-F687-4f45-9708-019B960494DF}">
-                  <a14:hiddenLine xmlns:a14="http://schemas.microsoft.com/office/drawing/2010/main" xmlns="" w="9525">
+                <a:ext uri="{91240B29-F687-4F45-9708-019B960494DF}">
+                  <a14:hiddenLine xmlns:a14="http://schemas.microsoft.com/office/drawing/2010/main" w="9525">
                     <a:solidFill>
                       <a:srgbClr val="000000"/>
                     </a:solidFill>
@@ -13367,7 +13367,7 @@
             <a:fld id="{48A87A34-81AB-432B-8DAE-1953F412C126}" type="datetimeFigureOut">
               <a:rPr lang="en-US" smtClean="0"/>
               <a:pPr/>
-              <a:t>2/14/2016</a:t>
+              <a:t>2/16/2016</a:t>
             </a:fld>
             <a:endParaRPr lang="en-US" dirty="0"/>
           </a:p>
@@ -13829,7 +13829,12 @@
             <p:ph type="subTitle" idx="1"/>
           </p:nvPr>
         </p:nvSpPr>
-        <p:spPr/>
+        <p:spPr>
+          <a:xfrm>
+            <a:off x="1484672" y="3602038"/>
+            <a:ext cx="7511844" cy="1655762"/>
+          </a:xfrm>
+        </p:spPr>
         <p:txBody>
           <a:bodyPr anchor="b"/>
           <a:lstStyle/>
@@ -13924,52 +13929,48 @@
         <p:spPr/>
         <p:txBody>
           <a:bodyPr>
-            <a:normAutofit fontScale="92500" lnSpcReduction="20000"/>
+            <a:normAutofit fontScale="92500" lnSpcReduction="10000"/>
           </a:bodyPr>
           <a:lstStyle/>
           <a:p>
             <a:r>
               <a:rPr lang="en-US" dirty="0" smtClean="0"/>
-              <a:t>Background</a:t>
-            </a:r>
+              <a:t>S/W Process VS S/W Methodology</a:t>
+            </a:r>
+            <a:endParaRPr lang="en-US" dirty="0" smtClean="0"/>
           </a:p>
           <a:p>
             <a:r>
               <a:rPr lang="en-US" dirty="0" smtClean="0"/>
-              <a:t>Issue</a:t>
-            </a:r>
+              <a:t>Existing Process Models</a:t>
+            </a:r>
+            <a:endParaRPr lang="en-US" dirty="0" smtClean="0"/>
           </a:p>
           <a:p>
             <a:r>
               <a:rPr lang="en-US" dirty="0" smtClean="0"/>
-              <a:t>Existing Processes</a:t>
+              <a:t>Features</a:t>
             </a:r>
           </a:p>
           <a:p>
             <a:r>
               <a:rPr lang="en-US" dirty="0" smtClean="0"/>
-              <a:t>Results</a:t>
+              <a:t>Model</a:t>
             </a:r>
           </a:p>
           <a:p>
             <a:r>
               <a:rPr lang="en-US" dirty="0" smtClean="0"/>
-              <a:t>Analysis</a:t>
-            </a:r>
-          </a:p>
-          <a:p>
-            <a:pPr lvl="1"/>
+              <a:t>Rounds</a:t>
+            </a:r>
+            <a:endParaRPr lang="en-US" dirty="0" smtClean="0"/>
+          </a:p>
+          <a:p>
             <a:r>
               <a:rPr lang="en-US" dirty="0" smtClean="0"/>
-              <a:t>Advantages</a:t>
-            </a:r>
-          </a:p>
-          <a:p>
-            <a:pPr lvl="1"/>
-            <a:r>
-              <a:rPr lang="en-US" dirty="0" smtClean="0"/>
-              <a:t>Disadvantages</a:t>
-            </a:r>
+              <a:t>Evaluation</a:t>
+            </a:r>
+            <a:endParaRPr lang="en-US" dirty="0" smtClean="0"/>
           </a:p>
           <a:p>
             <a:r>
@@ -14071,7 +14072,15 @@
             <a:pPr lvl="1"/>
             <a:r>
               <a:rPr lang="en-US" b="1" dirty="0" smtClean="0"/>
-              <a:t>“Provide guidance on t he order in which a project should carry out its major tasks</a:t>
+              <a:t>“Provide guidance on </a:t>
+            </a:r>
+            <a:r>
+              <a:rPr lang="en-US" b="1" dirty="0" smtClean="0"/>
+              <a:t>the </a:t>
+            </a:r>
+            <a:r>
+              <a:rPr lang="en-US" b="1" dirty="0" smtClean="0"/>
+              <a:t>order in which a project should carry out its major tasks</a:t>
             </a:r>
             <a:endParaRPr lang="en-US" b="1" dirty="0"/>
           </a:p>
@@ -14330,7 +14339,15 @@
           <a:p>
             <a:r>
               <a:rPr lang="en-US" dirty="0" smtClean="0"/>
-              <a:t>Prefers re-works at earlier stages as opposed to costly re-works in later stages</a:t>
+              <a:t>Prefers re-works </a:t>
+            </a:r>
+            <a:r>
+              <a:rPr lang="en-US" dirty="0" smtClean="0"/>
+              <a:t>in </a:t>
+            </a:r>
+            <a:r>
+              <a:rPr lang="en-US" dirty="0" smtClean="0"/>
+              <a:t>earlier stages as opposed to costly re-works in later stages</a:t>
             </a:r>
           </a:p>
           <a:p>
@@ -14587,7 +14604,7 @@
         </p:nvGraphicFramePr>
         <p:xfrm>
           <a:off x="1522809" y="1742059"/>
-          <a:ext cx="6096000" cy="4085158"/>
+          <a:ext cx="6096000" cy="4633798"/>
         </p:xfrm>
         <a:graphic>
           <a:graphicData uri="http://schemas.openxmlformats.org/drawingml/2006/table">
@@ -14761,6 +14778,88 @@
     <p:extLst>
       <p:ext uri="{BB962C8B-B14F-4D97-AF65-F5344CB8AC3E}">
         <p14:creationId xmlns:p14="http://schemas.microsoft.com/office/powerpoint/2010/main" val="865323751"/>
+      </p:ext>
+    </p:extLst>
+  </p:cSld>
+  <p:clrMapOvr>
+    <a:masterClrMapping/>
+  </p:clrMapOvr>
+</p:sld>
+</file>
+
+<file path=ppt/slides/slide9.xml><?xml version="1.0" encoding="utf-8"?>
+<p:sld xmlns:a="http://schemas.openxmlformats.org/drawingml/2006/main" xmlns:r="http://schemas.openxmlformats.org/officeDocument/2006/relationships" xmlns:p="http://schemas.openxmlformats.org/presentationml/2006/main">
+  <p:cSld>
+    <p:spTree>
+      <p:nvGrpSpPr>
+        <p:cNvPr id="1" name=""/>
+        <p:cNvGrpSpPr/>
+        <p:nvPr/>
+      </p:nvGrpSpPr>
+      <p:grpSpPr>
+        <a:xfrm>
+          <a:off x="0" y="0"/>
+          <a:ext cx="0" cy="0"/>
+          <a:chOff x="0" y="0"/>
+          <a:chExt cx="0" cy="0"/>
+        </a:xfrm>
+      </p:grpSpPr>
+      <p:sp>
+        <p:nvSpPr>
+          <p:cNvPr id="2" name="Title 1"/>
+          <p:cNvSpPr>
+            <a:spLocks noGrp="1"/>
+          </p:cNvSpPr>
+          <p:nvPr>
+            <p:ph type="title"/>
+          </p:nvPr>
+        </p:nvSpPr>
+        <p:spPr>
+          <a:xfrm>
+            <a:off x="867635" y="583794"/>
+            <a:ext cx="7429499" cy="1478570"/>
+          </a:xfrm>
+        </p:spPr>
+        <p:txBody>
+          <a:bodyPr/>
+          <a:lstStyle/>
+          <a:p>
+            <a:endParaRPr lang="en-US" dirty="0"/>
+          </a:p>
+        </p:txBody>
+      </p:sp>
+      <p:sp>
+        <p:nvSpPr>
+          <p:cNvPr id="3" name="Content Placeholder 2"/>
+          <p:cNvSpPr>
+            <a:spLocks noGrp="1"/>
+          </p:cNvSpPr>
+          <p:nvPr>
+            <p:ph idx="1"/>
+          </p:nvPr>
+        </p:nvSpPr>
+        <p:spPr/>
+        <p:txBody>
+          <a:bodyPr>
+            <a:normAutofit/>
+          </a:bodyPr>
+          <a:lstStyle/>
+          <a:p>
+            <a:pPr marL="0" indent="0" algn="ctr">
+              <a:buNone/>
+            </a:pPr>
+            <a:r>
+              <a:rPr lang="en-US" sz="3600" dirty="0" smtClean="0"/>
+              <a:t>Questions/Comments</a:t>
+            </a:r>
+            <a:endParaRPr lang="en-US" sz="3600" dirty="0"/>
+          </a:p>
+        </p:txBody>
+      </p:sp>
+    </p:spTree>
+    <p:extLst>
+      <p:ext uri="{BB962C8B-B14F-4D97-AF65-F5344CB8AC3E}">
+        <p14:creationId xmlns:p14="http://schemas.microsoft.com/office/powerpoint/2010/main" val="1850534339"/>
       </p:ext>
     </p:extLst>
   </p:cSld>
@@ -15015,7 +15114,7 @@
   <a:extraClrSchemeLst/>
   <a:extLst>
     <a:ext uri="{05A4C25C-085E-4340-85A3-A5531E510DB2}">
-      <thm15:themeFamily xmlns:thm15="http://schemas.microsoft.com/office/thememl/2012/main" name="Circuit" id="{0AC2F7E7-15F5-431C-B2A2-456FE929F56C}" vid="{0911B802-464C-4241-8DD9-B60FF88E379F}"/>
+      <thm15:themeFamily xmlns="" xmlns:thm15="http://schemas.microsoft.com/office/thememl/2012/main" name="Circuit" id="{0AC2F7E7-15F5-431C-B2A2-456FE929F56C}" vid="{0911B802-464C-4241-8DD9-B60FF88E379F}"/>
     </a:ext>
   </a:extLst>
 </a:theme>
@@ -15276,7 +15375,7 @@
   <a:extraClrSchemeLst/>
   <a:extLst>
     <a:ext uri="{05A4C25C-085E-4340-85A3-A5531E510DB2}">
-      <thm15:themeFamily xmlns:thm15="http://schemas.microsoft.com/office/thememl/2012/main" name="Office Theme" id="{62F939B6-93AF-4DB8-9C6B-D6C7DFDC589F}" vid="{4A3C46E8-61CC-4603-A589-7422A47A8E4A}"/>
+      <thm15:themeFamily xmlns="" xmlns:thm15="http://schemas.microsoft.com/office/thememl/2012/main" name="Office Theme" id="{62F939B6-93AF-4DB8-9C6B-D6C7DFDC589F}" vid="{4A3C46E8-61CC-4603-A589-7422A47A8E4A}"/>
     </a:ext>
   </a:extLst>
 </a:theme>

</xml_diff>